<commit_message>
add updated phi.pptx congruence.pptx to spring15, edit slidesS12/inversesmodn.pptx, edit CC logo slidesS15/halting-problem.pptx
</commit_message>
<xml_diff>
--- a/spring15/slidesS15/halting-problem.pptx
+++ b/spring15/slidesS15/halting-problem.pptx
@@ -2883,23 +2883,7 @@
                 <a:latin typeface="Comic Sans MS" pitchFamily="66" charset="0"/>
                 <a:cs typeface="Comic Sans MS"/>
               </a:rPr>
-              <a:t>Albert R Meyer,      March 4, </a:t>
-            </a:r>
-            <a:r>
-              <a:rPr kumimoji="0" lang="en-US" sz="1200" b="0" i="0" u="none" strike="noStrike" kern="1200" cap="none" spc="0" normalizeH="0" baseline="0" noProof="0" dirty="0" smtClean="0">
-                <a:ln>
-                  <a:noFill/>
-                </a:ln>
-                <a:solidFill>
-                  <a:schemeClr val="tx1"/>
-                </a:solidFill>
-                <a:effectLst/>
-                <a:uLnTx/>
-                <a:uFillTx/>
-                <a:latin typeface="Comic Sans MS" pitchFamily="66" charset="0"/>
-                <a:cs typeface="Comic Sans MS"/>
-              </a:rPr>
-              <a:t>2015</a:t>
+              <a:t>Albert R Meyer,      March 4, 2015</a:t>
             </a:r>
             <a:endParaRPr kumimoji="0" lang="en-US" sz="1200" b="0" i="0" u="none" strike="noStrike" kern="1200" cap="none" spc="0" normalizeH="0" baseline="0" noProof="0" dirty="0">
               <a:ln>
@@ -2919,9 +2903,9 @@
       </p:sp>
       <p:pic>
         <p:nvPicPr>
-          <p:cNvPr id="11" name="Picture 10" descr="license.img"/>
+          <p:cNvPr id="8" name="Picture 7"/>
           <p:cNvPicPr>
-            <a:picLocks/>
+            <a:picLocks noChangeAspect="1"/>
           </p:cNvPicPr>
           <p:nvPr userDrawn="1"/>
         </p:nvPicPr>
@@ -2933,8 +2917,8 @@
         </p:blipFill>
         <p:spPr>
           <a:xfrm>
-            <a:off x="76200" y="6486136"/>
-            <a:ext cx="990600" cy="304800"/>
+            <a:off x="0" y="6500090"/>
+            <a:ext cx="1016000" cy="357909"/>
           </a:xfrm>
           <a:prstGeom prst="rect">
             <a:avLst/>
@@ -11470,15 +11454,7 @@
             </a:r>
             <a:r>
               <a:rPr lang="en-US" sz="4800" dirty="0" smtClean="0"/>
-              <a:t>an</a:t>
-            </a:r>
-            <a:r>
-              <a:rPr lang="en-US" sz="4800" dirty="0" smtClean="0"/>
-              <a:t> </a:t>
-            </a:r>
-            <a:r>
-              <a:rPr lang="en-US" sz="4800" dirty="0" smtClean="0"/>
-              <a:t>ASCII string</a:t>
+              <a:t>an ASCII string</a:t>
             </a:r>
           </a:p>
           <a:p>

</xml_diff>